<commit_message>
Dodate neke sitnice u prezentaciju
</commit_message>
<xml_diff>
--- a/DB.pptx
+++ b/DB.pptx
@@ -485,7 +485,7 @@
           </a:lstStyle>
           <a:p>
             <a:r>
-              <a:rPr lang="en-US" smtClean="0"/>
+              <a:rPr lang="en-US" dirty="0" smtClean="0"/>
               <a:t>Click icon to add picture</a:t>
             </a:r>
             <a:endParaRPr lang="en-US" dirty="0"/>
@@ -2228,7 +2228,7 @@
           </a:lstStyle>
           <a:p>
             <a:r>
-              <a:rPr lang="en-US" smtClean="0"/>
+              <a:rPr lang="en-US" dirty="0" smtClean="0"/>
               <a:t>Click icon to add picture</a:t>
             </a:r>
             <a:endParaRPr lang="en-US" dirty="0"/>
@@ -2445,7 +2445,7 @@
           </a:lstStyle>
           <a:p>
             <a:r>
-              <a:rPr lang="en-US" smtClean="0"/>
+              <a:rPr lang="en-US" dirty="0" smtClean="0"/>
               <a:t>Click icon to add picture</a:t>
             </a:r>
             <a:endParaRPr lang="en-US" dirty="0"/>
@@ -2662,7 +2662,7 @@
           </a:lstStyle>
           <a:p>
             <a:r>
-              <a:rPr lang="en-US" smtClean="0"/>
+              <a:rPr lang="en-US" dirty="0" smtClean="0"/>
               <a:t>Click icon to add picture</a:t>
             </a:r>
             <a:endParaRPr lang="en-US" dirty="0"/>
@@ -5358,7 +5358,7 @@
           </a:lstStyle>
           <a:p>
             <a:r>
-              <a:rPr lang="en-US" smtClean="0"/>
+              <a:rPr lang="en-US" dirty="0" smtClean="0"/>
               <a:t>Click icon to add picture</a:t>
             </a:r>
             <a:endParaRPr lang="en-US" dirty="0"/>
@@ -5615,7 +5615,7 @@
           </a:lstStyle>
           <a:p>
             <a:r>
-              <a:rPr lang="en-US" smtClean="0"/>
+              <a:rPr lang="en-US" dirty="0" smtClean="0"/>
               <a:t>Click icon to add picture</a:t>
             </a:r>
             <a:endParaRPr lang="en-US" dirty="0"/>
@@ -7758,7 +7758,7 @@
           </a:lstStyle>
           <a:p>
             <a:r>
-              <a:rPr lang="en-US" smtClean="0"/>
+              <a:rPr lang="en-US" dirty="0" smtClean="0"/>
               <a:t>Click icon to add picture</a:t>
             </a:r>
             <a:endParaRPr lang="en-US" dirty="0"/>
@@ -7975,7 +7975,7 @@
           </a:lstStyle>
           <a:p>
             <a:r>
-              <a:rPr lang="en-US" smtClean="0"/>
+              <a:rPr lang="en-US" dirty="0" smtClean="0"/>
               <a:t>Click icon to add picture</a:t>
             </a:r>
             <a:endParaRPr lang="en-US" dirty="0"/>
@@ -8192,7 +8192,7 @@
           </a:lstStyle>
           <a:p>
             <a:r>
-              <a:rPr lang="en-US" smtClean="0"/>
+              <a:rPr lang="en-US" dirty="0" smtClean="0"/>
               <a:t>Click icon to add picture</a:t>
             </a:r>
             <a:endParaRPr lang="en-US" dirty="0"/>
@@ -10097,7 +10097,7 @@
           </a:lstStyle>
           <a:p>
             <a:r>
-              <a:rPr lang="en-US" smtClean="0"/>
+              <a:rPr lang="en-US" dirty="0" smtClean="0"/>
               <a:t>Click icon to add picture</a:t>
             </a:r>
             <a:endParaRPr lang="en-US" dirty="0"/>
@@ -12169,21 +12169,18 @@
           <a:p>
             <a:r>
               <a:rPr lang="sr-Latn-ME" u="sng" dirty="0" smtClean="0"/>
-              <a:t>Studenti</a:t>
+              <a:t>Student</a:t>
             </a:r>
             <a:r>
               <a:rPr lang="sr-Latn-ME" dirty="0" smtClean="0"/>
               <a:t>:</a:t>
             </a:r>
+            <a:endParaRPr lang="sr-Latn-ME" dirty="0" smtClean="0"/>
           </a:p>
           <a:p>
             <a:r>
               <a:rPr lang="en-US" dirty="0" smtClean="0"/>
-              <a:t>Dino </a:t>
-            </a:r>
-            <a:r>
-              <a:rPr lang="en-US" dirty="0" err="1" smtClean="0"/>
-              <a:t>Brdar</a:t>
+              <a:t>Dino Brdar</a:t>
             </a:r>
             <a:r>
               <a:rPr lang="sr-Latn-ME" dirty="0" smtClean="0"/>
@@ -12301,7 +12298,7 @@
         <p:spPr>
           <a:xfrm>
             <a:off x="493295" y="1997241"/>
-            <a:ext cx="6867625" cy="1200329"/>
+            <a:ext cx="7273461" cy="2585323"/>
           </a:xfrm>
           <a:prstGeom prst="rect">
             <a:avLst/>
@@ -12320,8 +12317,78 @@
             </a:pPr>
             <a:r>
               <a:rPr lang="sr-Latn-ME" dirty="0" smtClean="0"/>
-              <a:t>Kreiranje aplikacije koja prepoznaje prosleđenu melodiju i vraća njen naziv.</a:t>
-            </a:r>
+              <a:t>Kreiranje </a:t>
+            </a:r>
+            <a:r>
+              <a:rPr lang="sr-Latn-ME" dirty="0" smtClean="0"/>
+              <a:t>aplikativnog </a:t>
+            </a:r>
+            <a:r>
+              <a:rPr lang="sr-Latn-ME" dirty="0" err="1" smtClean="0"/>
+              <a:t>rešenja</a:t>
+            </a:r>
+            <a:r>
+              <a:rPr lang="sr-Latn-ME" dirty="0" smtClean="0"/>
+              <a:t> </a:t>
+            </a:r>
+            <a:r>
+              <a:rPr lang="sr-Latn-ME" dirty="0" smtClean="0"/>
+              <a:t>koja prepoznaje </a:t>
+            </a:r>
+            <a:r>
+              <a:rPr lang="sr-Latn-ME" dirty="0" err="1" smtClean="0"/>
+              <a:t>prosleđenu</a:t>
+            </a:r>
+            <a:r>
+              <a:rPr lang="sr-Latn-ME" dirty="0" smtClean="0"/>
+              <a:t> </a:t>
+            </a:r>
+            <a:r>
+              <a:rPr lang="sr-Latn-ME" dirty="0" smtClean="0"/>
+              <a:t>melodiju i vraća njen naziv</a:t>
+            </a:r>
+            <a:r>
+              <a:rPr lang="sr-Latn-ME" dirty="0" smtClean="0"/>
+              <a:t>.</a:t>
+            </a:r>
+          </a:p>
+          <a:p>
+            <a:pPr marL="285750" indent="-285750">
+              <a:buFont typeface="Arial" panose="020B0604020202020204" pitchFamily="34" charset="0"/>
+              <a:buChar char="•"/>
+            </a:pPr>
+            <a:endParaRPr lang="sr-Latn-ME" dirty="0"/>
+          </a:p>
+          <a:p>
+            <a:pPr marL="285750" indent="-285750">
+              <a:buFont typeface="Arial" panose="020B0604020202020204" pitchFamily="34" charset="0"/>
+              <a:buChar char="•"/>
+            </a:pPr>
+            <a:r>
+              <a:rPr lang="sr-Latn-ME" dirty="0" smtClean="0"/>
+              <a:t>Prosleđivanje melodije će potencijalno moći da se vrši na dva načina: </a:t>
+            </a:r>
+          </a:p>
+          <a:p>
+            <a:pPr marL="800100" lvl="1" indent="-342900">
+              <a:buFont typeface="+mj-lt"/>
+              <a:buAutoNum type="arabicPeriod"/>
+            </a:pPr>
+            <a:r>
+              <a:rPr lang="sr-Latn-ME" dirty="0" smtClean="0"/>
+              <a:t>Davanjem putanje do audio fajla</a:t>
+            </a:r>
+          </a:p>
+          <a:p>
+            <a:pPr marL="800100" lvl="1" indent="-342900">
+              <a:buFont typeface="+mj-lt"/>
+              <a:buAutoNum type="arabicPeriod"/>
+            </a:pPr>
+            <a:r>
+              <a:rPr lang="sr-Latn-ME" dirty="0" smtClean="0"/>
+              <a:t>„Slušanjem“ melodije upotrebom mikrofona</a:t>
+            </a:r>
+            <a:endParaRPr lang="sr-Latn-ME" dirty="0" smtClean="0"/>
           </a:p>
           <a:p>
             <a:endParaRPr lang="sr-Latn-ME" dirty="0" smtClean="0"/>
@@ -12510,6 +12577,85 @@
           </a:p>
         </p:txBody>
       </p:sp>
+      <p:pic>
+        <p:nvPicPr>
+          <p:cNvPr id="2" name="Picture 1"/>
+          <p:cNvPicPr>
+            <a:picLocks noChangeAspect="1"/>
+          </p:cNvPicPr>
+          <p:nvPr/>
+        </p:nvPicPr>
+        <p:blipFill>
+          <a:blip r:embed="rId2"/>
+          <a:stretch>
+            <a:fillRect/>
+          </a:stretch>
+        </p:blipFill>
+        <p:spPr>
+          <a:xfrm>
+            <a:off x="517357" y="3161476"/>
+            <a:ext cx="5366825" cy="2529794"/>
+          </a:xfrm>
+          <a:prstGeom prst="rect">
+            <a:avLst/>
+          </a:prstGeom>
+        </p:spPr>
+      </p:pic>
+      <p:pic>
+        <p:nvPicPr>
+          <p:cNvPr id="6" name="Picture 5"/>
+          <p:cNvPicPr>
+            <a:picLocks noChangeAspect="1"/>
+          </p:cNvPicPr>
+          <p:nvPr/>
+        </p:nvPicPr>
+        <p:blipFill>
+          <a:blip r:embed="rId3"/>
+          <a:stretch>
+            <a:fillRect/>
+          </a:stretch>
+        </p:blipFill>
+        <p:spPr>
+          <a:xfrm>
+            <a:off x="6155911" y="3410048"/>
+            <a:ext cx="5304082" cy="2032650"/>
+          </a:xfrm>
+          <a:prstGeom prst="rect">
+            <a:avLst/>
+          </a:prstGeom>
+        </p:spPr>
+      </p:pic>
+      <p:sp>
+        <p:nvSpPr>
+          <p:cNvPr id="7" name="TextBox 6"/>
+          <p:cNvSpPr txBox="1"/>
+          <p:nvPr/>
+        </p:nvSpPr>
+        <p:spPr>
+          <a:xfrm>
+            <a:off x="517357" y="6052622"/>
+            <a:ext cx="10942636" cy="307777"/>
+          </a:xfrm>
+          <a:prstGeom prst="rect">
+            <a:avLst/>
+          </a:prstGeom>
+          <a:noFill/>
+        </p:spPr>
+        <p:txBody>
+          <a:bodyPr wrap="square" rtlCol="0">
+            <a:spAutoFit/>
+          </a:bodyPr>
+          <a:lstStyle/>
+          <a:p>
+            <a:pPr algn="ctr"/>
+            <a:r>
+              <a:rPr lang="sr-Latn-RS" sz="1400" dirty="0" smtClean="0"/>
+              <a:t>Primeri spektralne analize unutar FL Studija, softvera za digitalnu obradu zvuka</a:t>
+            </a:r>
+            <a:endParaRPr lang="sr-Latn-RS" sz="1400" dirty="0"/>
+          </a:p>
+        </p:txBody>
+      </p:sp>
     </p:spTree>
     <p:extLst>
       <p:ext uri="{BB962C8B-B14F-4D97-AF65-F5344CB8AC3E}">
@@ -12633,7 +12779,15 @@
             </a:r>
             <a:r>
               <a:rPr lang="sr-Latn-RS" dirty="0" smtClean="0"/>
-              <a:t>– rešenje slično Shazam-u, s tim da ima i mogućnost da prepoznaje pevanje od strane korisnika, pa čak i zviždanje.</a:t>
+              <a:t>– rešenje slično </a:t>
+            </a:r>
+            <a:r>
+              <a:rPr lang="sr-Latn-RS" i="1" dirty="0" smtClean="0"/>
+              <a:t>Shazam</a:t>
+            </a:r>
+            <a:r>
+              <a:rPr lang="sr-Latn-RS" dirty="0" smtClean="0"/>
+              <a:t>-u, s tim da ima i mogućnost da prepoznaje pevanje od strane korisnika, pa čak i zviždanje.</a:t>
             </a:r>
             <a:endParaRPr lang="sr-Latn-RS" b="1" i="1" dirty="0" smtClean="0"/>
           </a:p>
@@ -12698,7 +12852,11 @@
             </a:r>
             <a:r>
               <a:rPr lang="sr-Latn-ME" dirty="0" smtClean="0"/>
-              <a:t>– proizvodi koji nemaju direktnu sličnost sa zadatkom ovog projekta, budući da se ovde radi o prepoznavanju glasa i glasovnih komandi, ali su takođe bili motivacija za moj kuriozitet prema ovoj materiji, s obzirom da se isto radi o manipulaciji prethodno konvertovanog zvučnog signala.</a:t>
+              <a:t>– proizvodi koji nemaju direktnu sličnost sa zadatkom ovog projekta, budući da se ovde radi o prepoznavanju glasa i glasovnih komandi, ali su takođe bili motivacija za moj kuriozitet prema ovoj materiji, s obzirom da se isto radi o manipulaciji </a:t>
+            </a:r>
+            <a:r>
+              <a:rPr lang="sr-Latn-ME" dirty="0" smtClean="0"/>
+              <a:t>sa prethodno konvertovanim zvučnim signalom.</a:t>
             </a:r>
             <a:endParaRPr lang="en-US" b="1" dirty="0"/>
           </a:p>
@@ -12793,7 +12951,15 @@
           <a:p>
             <a:r>
               <a:rPr lang="sr-Latn-ME" sz="3200" u="sng" dirty="0" smtClean="0"/>
-              <a:t>Tok izvršavanja  programa:</a:t>
+              <a:t>Tok </a:t>
+            </a:r>
+            <a:r>
+              <a:rPr lang="sr-Latn-ME" sz="3200" u="sng" dirty="0" smtClean="0"/>
+              <a:t>izvršavanja programa</a:t>
+            </a:r>
+            <a:r>
+              <a:rPr lang="sr-Latn-ME" sz="3200" u="sng" dirty="0" smtClean="0"/>
+              <a:t>:</a:t>
             </a:r>
             <a:endParaRPr lang="en-US" sz="3200" u="sng" dirty="0"/>
           </a:p>
@@ -12843,7 +13009,7 @@
         <p:spPr>
           <a:xfrm>
             <a:off x="469232" y="1913021"/>
-            <a:ext cx="8277726" cy="2308324"/>
+            <a:ext cx="8277726" cy="2585323"/>
           </a:xfrm>
           <a:prstGeom prst="rect">
             <a:avLst/>
@@ -12866,7 +13032,11 @@
             </a:r>
             <a:r>
               <a:rPr lang="sr-Latn-RS" dirty="0" smtClean="0"/>
-              <a:t>za prepoznavanje nota.</a:t>
+              <a:t>za prepoznavanje </a:t>
+            </a:r>
+            <a:r>
+              <a:rPr lang="sr-Latn-RS" dirty="0" smtClean="0"/>
+              <a:t>nota, a zatim i melodija (koje su u suštini niz nota).</a:t>
             </a:r>
             <a:endParaRPr lang="sr-Latn-ME" dirty="0" smtClean="0"/>
           </a:p>
@@ -12884,13 +13054,8 @@
             </a:pPr>
             <a:r>
               <a:rPr lang="sr-Latn-ME" dirty="0" smtClean="0"/>
-              <a:t>Učitavanje test </a:t>
-            </a:r>
-            <a:r>
-              <a:rPr lang="sr-Latn-ME" dirty="0" smtClean="0"/>
-              <a:t>audio zapisa.</a:t>
-            </a:r>
-            <a:endParaRPr lang="sr-Latn-ME" dirty="0" smtClean="0"/>
+              <a:t>Učitavanje test audio zapisa.</a:t>
+            </a:r>
           </a:p>
           <a:p>
             <a:pPr marL="342900" indent="-342900">
@@ -12910,11 +13075,11 @@
             </a:r>
             <a:r>
               <a:rPr lang="sr-Latn-ME" dirty="0" smtClean="0"/>
-              <a:t>niza nota kao melodije uz </a:t>
+              <a:t>melodije </a:t>
             </a:r>
             <a:r>
               <a:rPr lang="sr-Latn-ME" dirty="0" smtClean="0"/>
-              <a:t>pomoć neuronske mreže.</a:t>
+              <a:t>uz pomoć neuronske mreže.</a:t>
             </a:r>
           </a:p>
           <a:p>

</xml_diff>